<commit_message>
Minor Level Changes and Presentation
</commit_message>
<xml_diff>
--- a/GDD 1101-001 Demo 3.pptx
+++ b/GDD 1101-001 Demo 3.pptx
@@ -128,18 +128,18 @@
   <pc:docChgLst>
     <pc:chgData name="Camilla Lucero" userId="f439bb5a6a9b328f" providerId="LiveId" clId="{8EF28FE2-BE11-4A4D-BC83-93DA7904FFC4}"/>
     <pc:docChg chg="undo custSel modSld">
-      <pc:chgData name="Camilla Lucero" userId="f439bb5a6a9b328f" providerId="LiveId" clId="{8EF28FE2-BE11-4A4D-BC83-93DA7904FFC4}" dt="2022-11-02T02:13:44.402" v="558" actId="20577"/>
+      <pc:chgData name="Camilla Lucero" userId="f439bb5a6a9b328f" providerId="LiveId" clId="{8EF28FE2-BE11-4A4D-BC83-93DA7904FFC4}" dt="2022-11-07T17:55:54.605" v="677" actId="20577"/>
       <pc:docMkLst>
         <pc:docMk/>
       </pc:docMkLst>
       <pc:sldChg chg="delSp modSp mod delAnim">
-        <pc:chgData name="Camilla Lucero" userId="f439bb5a6a9b328f" providerId="LiveId" clId="{8EF28FE2-BE11-4A4D-BC83-93DA7904FFC4}" dt="2022-11-02T01:18:56.814" v="143" actId="20577"/>
+        <pc:chgData name="Camilla Lucero" userId="f439bb5a6a9b328f" providerId="LiveId" clId="{8EF28FE2-BE11-4A4D-BC83-93DA7904FFC4}" dt="2022-11-07T17:55:54.605" v="677" actId="20577"/>
         <pc:sldMkLst>
           <pc:docMk/>
           <pc:sldMk cId="3686354931" sldId="257"/>
         </pc:sldMkLst>
         <pc:spChg chg="mod">
-          <ac:chgData name="Camilla Lucero" userId="f439bb5a6a9b328f" providerId="LiveId" clId="{8EF28FE2-BE11-4A4D-BC83-93DA7904FFC4}" dt="2022-11-02T01:18:56.814" v="143" actId="20577"/>
+          <ac:chgData name="Camilla Lucero" userId="f439bb5a6a9b328f" providerId="LiveId" clId="{8EF28FE2-BE11-4A4D-BC83-93DA7904FFC4}" dt="2022-11-07T17:55:54.605" v="677" actId="20577"/>
           <ac:spMkLst>
             <pc:docMk/>
             <pc:sldMk cId="3686354931" sldId="257"/>
@@ -359,7 +359,7 @@
           <a:p>
             <a:fld id="{1F7CEB81-7C9F-4C3F-BDEE-7044CE692A8A}" type="datetimeFigureOut">
               <a:rPr lang="en-US" smtClean="0"/>
-              <a:t>11/1/2022</a:t>
+              <a:t>11/7/2022</a:t>
             </a:fld>
             <a:endParaRPr lang="en-US"/>
           </a:p>
@@ -587,7 +587,7 @@
           <a:p>
             <a:fld id="{1F7CEB81-7C9F-4C3F-BDEE-7044CE692A8A}" type="datetimeFigureOut">
               <a:rPr lang="en-US" smtClean="0"/>
-              <a:t>11/1/2022</a:t>
+              <a:t>11/7/2022</a:t>
             </a:fld>
             <a:endParaRPr lang="en-US"/>
           </a:p>
@@ -767,7 +767,7 @@
           <a:p>
             <a:fld id="{1F7CEB81-7C9F-4C3F-BDEE-7044CE692A8A}" type="datetimeFigureOut">
               <a:rPr lang="en-US" smtClean="0"/>
-              <a:t>11/1/2022</a:t>
+              <a:t>11/7/2022</a:t>
             </a:fld>
             <a:endParaRPr lang="en-US"/>
           </a:p>
@@ -937,7 +937,7 @@
           <a:p>
             <a:fld id="{1F7CEB81-7C9F-4C3F-BDEE-7044CE692A8A}" type="datetimeFigureOut">
               <a:rPr lang="en-US" smtClean="0"/>
-              <a:t>11/1/2022</a:t>
+              <a:t>11/7/2022</a:t>
             </a:fld>
             <a:endParaRPr lang="en-US"/>
           </a:p>
@@ -1191,7 +1191,7 @@
           <a:p>
             <a:fld id="{1F7CEB81-7C9F-4C3F-BDEE-7044CE692A8A}" type="datetimeFigureOut">
               <a:rPr lang="en-US" smtClean="0"/>
-              <a:t>11/1/2022</a:t>
+              <a:t>11/7/2022</a:t>
             </a:fld>
             <a:endParaRPr lang="en-US"/>
           </a:p>
@@ -1517,7 +1517,7 @@
           <a:p>
             <a:fld id="{1F7CEB81-7C9F-4C3F-BDEE-7044CE692A8A}" type="datetimeFigureOut">
               <a:rPr lang="en-US" smtClean="0"/>
-              <a:t>11/1/2022</a:t>
+              <a:t>11/7/2022</a:t>
             </a:fld>
             <a:endParaRPr lang="en-US"/>
           </a:p>
@@ -1968,7 +1968,7 @@
           <a:p>
             <a:fld id="{1F7CEB81-7C9F-4C3F-BDEE-7044CE692A8A}" type="datetimeFigureOut">
               <a:rPr lang="en-US" smtClean="0"/>
-              <a:t>11/1/2022</a:t>
+              <a:t>11/7/2022</a:t>
             </a:fld>
             <a:endParaRPr lang="en-US"/>
           </a:p>
@@ -2086,7 +2086,7 @@
           <a:p>
             <a:fld id="{1F7CEB81-7C9F-4C3F-BDEE-7044CE692A8A}" type="datetimeFigureOut">
               <a:rPr lang="en-US" smtClean="0"/>
-              <a:t>11/1/2022</a:t>
+              <a:t>11/7/2022</a:t>
             </a:fld>
             <a:endParaRPr lang="en-US"/>
           </a:p>
@@ -2181,7 +2181,7 @@
           <a:p>
             <a:fld id="{1F7CEB81-7C9F-4C3F-BDEE-7044CE692A8A}" type="datetimeFigureOut">
               <a:rPr lang="en-US" smtClean="0"/>
-              <a:t>11/1/2022</a:t>
+              <a:t>11/7/2022</a:t>
             </a:fld>
             <a:endParaRPr lang="en-US"/>
           </a:p>
@@ -2468,7 +2468,7 @@
           <a:p>
             <a:fld id="{1F7CEB81-7C9F-4C3F-BDEE-7044CE692A8A}" type="datetimeFigureOut">
               <a:rPr lang="en-US" smtClean="0"/>
-              <a:t>11/1/2022</a:t>
+              <a:t>11/7/2022</a:t>
             </a:fld>
             <a:endParaRPr lang="en-US"/>
           </a:p>
@@ -2790,7 +2790,7 @@
           <a:p>
             <a:fld id="{1F7CEB81-7C9F-4C3F-BDEE-7044CE692A8A}" type="datetimeFigureOut">
               <a:rPr lang="en-US" smtClean="0"/>
-              <a:t>11/1/2022</a:t>
+              <a:t>11/7/2022</a:t>
             </a:fld>
             <a:endParaRPr lang="en-US"/>
           </a:p>
@@ -3044,7 +3044,7 @@
           <a:p>
             <a:fld id="{1F7CEB81-7C9F-4C3F-BDEE-7044CE692A8A}" type="datetimeFigureOut">
               <a:rPr lang="en-US" smtClean="0"/>
-              <a:t>11/1/2022</a:t>
+              <a:t>11/7/2022</a:t>
             </a:fld>
             <a:endParaRPr lang="en-US"/>
           </a:p>
@@ -3683,59 +3683,39 @@
         </p:spPr>
         <p:txBody>
           <a:bodyPr>
-            <a:normAutofit lnSpcReduction="10000"/>
+            <a:normAutofit/>
           </a:bodyPr>
           <a:lstStyle/>
           <a:p>
             <a:r>
               <a:rPr lang="en-US" dirty="0"/>
-              <a:t>Background – Started, but Relies on Level Design</a:t>
+              <a:t>Background – </a:t>
             </a:r>
           </a:p>
           <a:p>
             <a:r>
               <a:rPr lang="en-US" dirty="0"/>
-              <a:t>HUD – Health Bar, Weapon Inventory (?), Something to keep track of our powerups – Not Started</a:t>
+              <a:t>HUD – Still discussing</a:t>
             </a:r>
           </a:p>
           <a:p>
             <a:r>
               <a:rPr lang="en-US" dirty="0"/>
-              <a:t>Troubleshoot our Ghost Enemy – They’re not doing so well... – Not Done</a:t>
+              <a:t>Troubleshoot our Ghost Enemy– Not Done</a:t>
             </a:r>
           </a:p>
           <a:p>
             <a:r>
               <a:rPr lang="en-US" dirty="0"/>
-              <a:t>Sort out our Level Design – Still Discussing</a:t>
-            </a:r>
-          </a:p>
-          <a:p>
-            <a:pPr lvl="1"/>
-            <a:r>
-              <a:rPr lang="en-US" dirty="0"/>
-              <a:t>Figure out level dimensions</a:t>
-            </a:r>
-          </a:p>
-          <a:p>
-            <a:pPr lvl="1"/>
-            <a:r>
-              <a:rPr lang="en-US" dirty="0"/>
-              <a:t>Parkour Additions</a:t>
-            </a:r>
-          </a:p>
-          <a:p>
-            <a:pPr lvl="1"/>
-            <a:r>
-              <a:rPr lang="en-US" dirty="0"/>
-              <a:t>Make things a level instead of an enemy test!</a:t>
-            </a:r>
-          </a:p>
-          <a:p>
-            <a:r>
-              <a:rPr lang="en-US" dirty="0"/>
-              <a:t>Begin working on Weapons, Bullets, etc. - Discussing</a:t>
-            </a:r>
+              <a:t>Begin working on Weapons, Bullets, etc. – Sprites Done! Stats still to come</a:t>
+            </a:r>
+          </a:p>
+          <a:p>
+            <a:r>
+              <a:rPr lang="en-US"/>
+              <a:t>Tilesets</a:t>
+            </a:r>
+            <a:endParaRPr lang="en-US" dirty="0"/>
           </a:p>
           <a:p>
             <a:r>

</xml_diff>